<commit_message>
[doc] TDD 페이지 작성 01
</commit_message>
<xml_diff>
--- a/SSD_B_BestReviewer.pptx
+++ b/SSD_B_BestReviewer.pptx
@@ -13727,7 +13727,7 @@
         <p:spPr>
           <a:xfrm>
             <a:off x="605980" y="1098330"/>
-            <a:ext cx="1366080" cy="400110"/>
+            <a:ext cx="4100803" cy="400110"/>
           </a:xfrm>
           <a:prstGeom prst="rect">
             <a:avLst/>
@@ -13744,7 +13744,15 @@
           <a:p>
             <a:r>
               <a:rPr lang="en-US" altLang="ko-KR" sz="2000" b="1" dirty="0"/>
-              <a:t>[Mock #1]</a:t>
+              <a:t>[Mock #1 – SSD</a:t>
+            </a:r>
+            <a:r>
+              <a:rPr lang="ko-KR" altLang="en-US" sz="2000" b="1" dirty="0"/>
+              <a:t> </a:t>
+            </a:r>
+            <a:r>
+              <a:rPr lang="en-US" altLang="ko-KR" sz="2000" b="1" dirty="0"/>
+              <a:t>Driver Mocking]</a:t>
             </a:r>
             <a:endParaRPr lang="ko-KR" altLang="en-US" sz="2000" b="1" dirty="0"/>
           </a:p>
@@ -13839,6 +13847,460 @@
               <a:t>[Mock #2]</a:t>
             </a:r>
             <a:endParaRPr lang="ko-KR" altLang="en-US" sz="2000" b="1" dirty="0"/>
+          </a:p>
+        </p:txBody>
+      </p:sp>
+      <p:sp>
+        <p:nvSpPr>
+          <p:cNvPr id="7" name="TextBox 12">
+            <a:extLst>
+              <a:ext uri="{FF2B5EF4-FFF2-40B4-BE49-F238E27FC236}">
+                <a16:creationId xmlns:a16="http://schemas.microsoft.com/office/drawing/2014/main" id="{4C7DB525-A997-4763-861C-5FD01054FACA}"/>
+              </a:ext>
+            </a:extLst>
+          </p:cNvPr>
+          <p:cNvSpPr txBox="1"/>
+          <p:nvPr/>
+        </p:nvSpPr>
+        <p:spPr>
+          <a:xfrm>
+            <a:off x="499448" y="1809427"/>
+            <a:ext cx="1332416" cy="338554"/>
+          </a:xfrm>
+          <a:prstGeom prst="rect">
+            <a:avLst/>
+          </a:prstGeom>
+          <a:noFill/>
+        </p:spPr>
+        <p:txBody>
+          <a:bodyPr wrap="none" rtlCol="0">
+            <a:spAutoFit/>
+          </a:bodyPr>
+          <a:lstStyle>
+            <a:defPPr marR="0" lvl="0" algn="l" rtl="0">
+              <a:lnSpc>
+                <a:spcPct val="100000"/>
+              </a:lnSpc>
+              <a:spcBef>
+                <a:spcPts val="0"/>
+              </a:spcBef>
+              <a:spcAft>
+                <a:spcPts val="0"/>
+              </a:spcAft>
+            </a:defPPr>
+            <a:lvl1pPr marR="0" lvl="0" algn="l" rtl="0">
+              <a:lnSpc>
+                <a:spcPct val="100000"/>
+              </a:lnSpc>
+              <a:spcBef>
+                <a:spcPts val="0"/>
+              </a:spcBef>
+              <a:spcAft>
+                <a:spcPts val="0"/>
+              </a:spcAft>
+              <a:buClr>
+                <a:srgbClr val="000000"/>
+              </a:buClr>
+              <a:buFont typeface="Arial"/>
+              <a:defRPr sz="1400" b="0" i="0" u="none" strike="noStrike" cap="none">
+                <a:solidFill>
+                  <a:srgbClr val="000000"/>
+                </a:solidFill>
+                <a:latin typeface="Arial"/>
+                <a:ea typeface="Arial"/>
+                <a:cs typeface="Arial"/>
+                <a:sym typeface="Arial"/>
+              </a:defRPr>
+            </a:lvl1pPr>
+            <a:lvl2pPr marR="0" lvl="1" algn="l" rtl="0">
+              <a:lnSpc>
+                <a:spcPct val="100000"/>
+              </a:lnSpc>
+              <a:spcBef>
+                <a:spcPts val="0"/>
+              </a:spcBef>
+              <a:spcAft>
+                <a:spcPts val="0"/>
+              </a:spcAft>
+              <a:buClr>
+                <a:srgbClr val="000000"/>
+              </a:buClr>
+              <a:buFont typeface="Arial"/>
+              <a:defRPr sz="1400" b="0" i="0" u="none" strike="noStrike" cap="none">
+                <a:solidFill>
+                  <a:srgbClr val="000000"/>
+                </a:solidFill>
+                <a:latin typeface="Arial"/>
+                <a:ea typeface="Arial"/>
+                <a:cs typeface="Arial"/>
+                <a:sym typeface="Arial"/>
+              </a:defRPr>
+            </a:lvl2pPr>
+            <a:lvl3pPr marR="0" lvl="2" algn="l" rtl="0">
+              <a:lnSpc>
+                <a:spcPct val="100000"/>
+              </a:lnSpc>
+              <a:spcBef>
+                <a:spcPts val="0"/>
+              </a:spcBef>
+              <a:spcAft>
+                <a:spcPts val="0"/>
+              </a:spcAft>
+              <a:buClr>
+                <a:srgbClr val="000000"/>
+              </a:buClr>
+              <a:buFont typeface="Arial"/>
+              <a:defRPr sz="1400" b="0" i="0" u="none" strike="noStrike" cap="none">
+                <a:solidFill>
+                  <a:srgbClr val="000000"/>
+                </a:solidFill>
+                <a:latin typeface="Arial"/>
+                <a:ea typeface="Arial"/>
+                <a:cs typeface="Arial"/>
+                <a:sym typeface="Arial"/>
+              </a:defRPr>
+            </a:lvl3pPr>
+            <a:lvl4pPr marR="0" lvl="3" algn="l" rtl="0">
+              <a:lnSpc>
+                <a:spcPct val="100000"/>
+              </a:lnSpc>
+              <a:spcBef>
+                <a:spcPts val="0"/>
+              </a:spcBef>
+              <a:spcAft>
+                <a:spcPts val="0"/>
+              </a:spcAft>
+              <a:buClr>
+                <a:srgbClr val="000000"/>
+              </a:buClr>
+              <a:buFont typeface="Arial"/>
+              <a:defRPr sz="1400" b="0" i="0" u="none" strike="noStrike" cap="none">
+                <a:solidFill>
+                  <a:srgbClr val="000000"/>
+                </a:solidFill>
+                <a:latin typeface="Arial"/>
+                <a:ea typeface="Arial"/>
+                <a:cs typeface="Arial"/>
+                <a:sym typeface="Arial"/>
+              </a:defRPr>
+            </a:lvl4pPr>
+            <a:lvl5pPr marR="0" lvl="4" algn="l" rtl="0">
+              <a:lnSpc>
+                <a:spcPct val="100000"/>
+              </a:lnSpc>
+              <a:spcBef>
+                <a:spcPts val="0"/>
+              </a:spcBef>
+              <a:spcAft>
+                <a:spcPts val="0"/>
+              </a:spcAft>
+              <a:buClr>
+                <a:srgbClr val="000000"/>
+              </a:buClr>
+              <a:buFont typeface="Arial"/>
+              <a:defRPr sz="1400" b="0" i="0" u="none" strike="noStrike" cap="none">
+                <a:solidFill>
+                  <a:srgbClr val="000000"/>
+                </a:solidFill>
+                <a:latin typeface="Arial"/>
+                <a:ea typeface="Arial"/>
+                <a:cs typeface="Arial"/>
+                <a:sym typeface="Arial"/>
+              </a:defRPr>
+            </a:lvl5pPr>
+            <a:lvl6pPr marR="0" lvl="5" algn="l" rtl="0">
+              <a:lnSpc>
+                <a:spcPct val="100000"/>
+              </a:lnSpc>
+              <a:spcBef>
+                <a:spcPts val="0"/>
+              </a:spcBef>
+              <a:spcAft>
+                <a:spcPts val="0"/>
+              </a:spcAft>
+              <a:buClr>
+                <a:srgbClr val="000000"/>
+              </a:buClr>
+              <a:buFont typeface="Arial"/>
+              <a:defRPr sz="1400" b="0" i="0" u="none" strike="noStrike" cap="none">
+                <a:solidFill>
+                  <a:srgbClr val="000000"/>
+                </a:solidFill>
+                <a:latin typeface="Arial"/>
+                <a:ea typeface="Arial"/>
+                <a:cs typeface="Arial"/>
+                <a:sym typeface="Arial"/>
+              </a:defRPr>
+            </a:lvl6pPr>
+            <a:lvl7pPr marR="0" lvl="6" algn="l" rtl="0">
+              <a:lnSpc>
+                <a:spcPct val="100000"/>
+              </a:lnSpc>
+              <a:spcBef>
+                <a:spcPts val="0"/>
+              </a:spcBef>
+              <a:spcAft>
+                <a:spcPts val="0"/>
+              </a:spcAft>
+              <a:buClr>
+                <a:srgbClr val="000000"/>
+              </a:buClr>
+              <a:buFont typeface="Arial"/>
+              <a:defRPr sz="1400" b="0" i="0" u="none" strike="noStrike" cap="none">
+                <a:solidFill>
+                  <a:srgbClr val="000000"/>
+                </a:solidFill>
+                <a:latin typeface="Arial"/>
+                <a:ea typeface="Arial"/>
+                <a:cs typeface="Arial"/>
+                <a:sym typeface="Arial"/>
+              </a:defRPr>
+            </a:lvl7pPr>
+            <a:lvl8pPr marR="0" lvl="7" algn="l" rtl="0">
+              <a:lnSpc>
+                <a:spcPct val="100000"/>
+              </a:lnSpc>
+              <a:spcBef>
+                <a:spcPts val="0"/>
+              </a:spcBef>
+              <a:spcAft>
+                <a:spcPts val="0"/>
+              </a:spcAft>
+              <a:buClr>
+                <a:srgbClr val="000000"/>
+              </a:buClr>
+              <a:buFont typeface="Arial"/>
+              <a:defRPr sz="1400" b="0" i="0" u="none" strike="noStrike" cap="none">
+                <a:solidFill>
+                  <a:srgbClr val="000000"/>
+                </a:solidFill>
+                <a:latin typeface="Arial"/>
+                <a:ea typeface="Arial"/>
+                <a:cs typeface="Arial"/>
+                <a:sym typeface="Arial"/>
+              </a:defRPr>
+            </a:lvl8pPr>
+            <a:lvl9pPr marR="0" lvl="8" algn="l" rtl="0">
+              <a:lnSpc>
+                <a:spcPct val="100000"/>
+              </a:lnSpc>
+              <a:spcBef>
+                <a:spcPts val="0"/>
+              </a:spcBef>
+              <a:spcAft>
+                <a:spcPts val="0"/>
+              </a:spcAft>
+              <a:buClr>
+                <a:srgbClr val="000000"/>
+              </a:buClr>
+              <a:buFont typeface="Arial"/>
+              <a:defRPr sz="1400" b="0" i="0" u="none" strike="noStrike" cap="none">
+                <a:solidFill>
+                  <a:srgbClr val="000000"/>
+                </a:solidFill>
+                <a:latin typeface="Arial"/>
+                <a:ea typeface="Arial"/>
+                <a:cs typeface="Arial"/>
+                <a:sym typeface="Arial"/>
+              </a:defRPr>
+            </a:lvl9pPr>
+          </a:lstStyle>
+          <a:p>
+            <a:r>
+              <a:rPr lang="ko-KR" altLang="en-US" sz="1600" dirty="0"/>
+              <a:t>▶</a:t>
+            </a:r>
+            <a:r>
+              <a:rPr lang="en-US" altLang="ko-KR" sz="1600" dirty="0"/>
+              <a:t> Stubbing</a:t>
+            </a:r>
+            <a:endParaRPr lang="ko-KR" altLang="en-US" sz="1600" b="1" dirty="0">
+              <a:solidFill>
+                <a:srgbClr val="0070C0"/>
+              </a:solidFill>
+            </a:endParaRPr>
+          </a:p>
+        </p:txBody>
+      </p:sp>
+      <p:pic>
+        <p:nvPicPr>
+          <p:cNvPr id="1026" name="Picture 2">
+            <a:extLst>
+              <a:ext uri="{FF2B5EF4-FFF2-40B4-BE49-F238E27FC236}">
+                <a16:creationId xmlns:a16="http://schemas.microsoft.com/office/drawing/2014/main" id="{FD08B28D-310B-434B-AE20-EA4327623FF4}"/>
+              </a:ext>
+            </a:extLst>
+          </p:cNvPr>
+          <p:cNvPicPr>
+            <a:picLocks noChangeAspect="1" noChangeArrowheads="1"/>
+          </p:cNvPicPr>
+          <p:nvPr/>
+        </p:nvPicPr>
+        <p:blipFill>
+          <a:blip r:embed="rId3">
+            <a:extLst>
+              <a:ext uri="{28A0092B-C50C-407E-A947-70E740481C1C}">
+                <a14:useLocalDpi xmlns:a14="http://schemas.microsoft.com/office/drawing/2010/main" val="0"/>
+              </a:ext>
+            </a:extLst>
+          </a:blip>
+          <a:srcRect/>
+          <a:stretch>
+            <a:fillRect/>
+          </a:stretch>
+        </p:blipFill>
+        <p:spPr bwMode="auto">
+          <a:xfrm>
+            <a:off x="661392" y="3686758"/>
+            <a:ext cx="5192284" cy="2468140"/>
+          </a:xfrm>
+          <a:prstGeom prst="rect">
+            <a:avLst/>
+          </a:prstGeom>
+          <a:noFill/>
+          <a:extLst>
+            <a:ext uri="{909E8E84-426E-40DD-AFC4-6F175D3DCCD1}">
+              <a14:hiddenFill xmlns:a14="http://schemas.microsoft.com/office/drawing/2010/main">
+                <a:solidFill>
+                  <a:srgbClr val="FFFFFF"/>
+                </a:solidFill>
+              </a14:hiddenFill>
+            </a:ext>
+          </a:extLst>
+        </p:spPr>
+      </p:pic>
+      <p:sp>
+        <p:nvSpPr>
+          <p:cNvPr id="9" name="TextBox 8">
+            <a:extLst>
+              <a:ext uri="{FF2B5EF4-FFF2-40B4-BE49-F238E27FC236}">
+                <a16:creationId xmlns:a16="http://schemas.microsoft.com/office/drawing/2014/main" id="{DADAFE62-F852-4F10-90A1-3CF4BBE5BD22}"/>
+              </a:ext>
+            </a:extLst>
+          </p:cNvPr>
+          <p:cNvSpPr txBox="1"/>
+          <p:nvPr/>
+        </p:nvSpPr>
+        <p:spPr>
+          <a:xfrm>
+            <a:off x="605980" y="2246883"/>
+            <a:ext cx="5112297" cy="1021562"/>
+          </a:xfrm>
+          <a:prstGeom prst="rect">
+            <a:avLst/>
+          </a:prstGeom>
+          <a:noFill/>
+        </p:spPr>
+        <p:txBody>
+          <a:bodyPr wrap="none" rtlCol="0">
+            <a:spAutoFit/>
+          </a:bodyPr>
+          <a:lstStyle/>
+          <a:p>
+            <a:pPr>
+              <a:lnSpc>
+                <a:spcPct val="150000"/>
+              </a:lnSpc>
+            </a:pPr>
+            <a:r>
+              <a:rPr lang="en-US" altLang="ko-KR" dirty="0"/>
+              <a:t>- </a:t>
+            </a:r>
+            <a:r>
+              <a:rPr lang="ko-KR" altLang="en-US" dirty="0"/>
+              <a:t>목적</a:t>
+            </a:r>
+            <a:r>
+              <a:rPr lang="en-US" altLang="ko-KR" dirty="0"/>
+              <a:t>: SSD </a:t>
+            </a:r>
+            <a:r>
+              <a:rPr lang="ko-KR" altLang="en-US" dirty="0"/>
+              <a:t>개발 완료 전 테스트 진행</a:t>
+            </a:r>
+            <a:endParaRPr lang="en-US" altLang="ko-KR" dirty="0"/>
+          </a:p>
+          <a:p>
+            <a:pPr>
+              <a:lnSpc>
+                <a:spcPct val="150000"/>
+              </a:lnSpc>
+            </a:pPr>
+            <a:r>
+              <a:rPr lang="en-US" altLang="ko-KR" dirty="0"/>
+              <a:t>- </a:t>
+            </a:r>
+            <a:r>
+              <a:rPr lang="ko-KR" altLang="en-US" dirty="0"/>
+              <a:t>방법</a:t>
+            </a:r>
+            <a:r>
+              <a:rPr lang="en-US" altLang="ko-KR" dirty="0"/>
+              <a:t>: </a:t>
+            </a:r>
+            <a:r>
+              <a:rPr lang="ko-KR" altLang="en-US" dirty="0"/>
+              <a:t>반환 값 지정</a:t>
+            </a:r>
+            <a:r>
+              <a:rPr lang="en-US" altLang="ko-KR" dirty="0"/>
+              <a:t>(</a:t>
+            </a:r>
+            <a:r>
+              <a:rPr lang="en-US" altLang="ko-KR" dirty="0" err="1"/>
+              <a:t>run_ssd_read</a:t>
+            </a:r>
+            <a:r>
+              <a:rPr lang="en-US" altLang="ko-KR" dirty="0"/>
+              <a:t> </a:t>
+            </a:r>
+            <a:r>
+              <a:rPr lang="ko-KR" altLang="en-US" dirty="0"/>
+              <a:t>함수의 </a:t>
+            </a:r>
+            <a:r>
+              <a:rPr lang="en-US" altLang="ko-KR" dirty="0"/>
+              <a:t>return </a:t>
+            </a:r>
+            <a:r>
+              <a:rPr lang="ko-KR" altLang="en-US" dirty="0"/>
+              <a:t>값</a:t>
+            </a:r>
+            <a:r>
+              <a:rPr lang="en-US" altLang="ko-KR" dirty="0"/>
+              <a:t>, </a:t>
+            </a:r>
+            <a:r>
+              <a:rPr lang="ko-KR" altLang="en-US" dirty="0"/>
+              <a:t>호출 여부</a:t>
+            </a:r>
+            <a:r>
+              <a:rPr lang="en-US" altLang="ko-KR" dirty="0"/>
+              <a:t>)</a:t>
+            </a:r>
+          </a:p>
+          <a:p>
+            <a:pPr>
+              <a:lnSpc>
+                <a:spcPct val="150000"/>
+              </a:lnSpc>
+            </a:pPr>
+            <a:r>
+              <a:rPr lang="en-US" altLang="ko-KR" dirty="0"/>
+              <a:t>- </a:t>
+            </a:r>
+            <a:r>
+              <a:rPr lang="ko-KR" altLang="en-US" dirty="0"/>
+              <a:t>검증</a:t>
+            </a:r>
+            <a:r>
+              <a:rPr lang="en-US" altLang="ko-KR" dirty="0"/>
+              <a:t>: assert</a:t>
+            </a:r>
+            <a:r>
+              <a:rPr lang="ko-KR" altLang="en-US" dirty="0"/>
+              <a:t> 문을 활용한 리턴 값 및 호출 확인</a:t>
+            </a:r>
           </a:p>
         </p:txBody>
       </p:sp>

</xml_diff>

<commit_message>
[doc] TDD 페이지 작성 Final
</commit_message>
<xml_diff>
--- a/SSD_B_BestReviewer.pptx
+++ b/SSD_B_BestReviewer.pptx
@@ -5,7 +5,7 @@
     <p:sldMasterId id="2147483648" r:id="rId1"/>
   </p:sldMasterIdLst>
   <p:notesMasterIdLst>
-    <p:notesMasterId r:id="rId16"/>
+    <p:notesMasterId r:id="rId17"/>
   </p:notesMasterIdLst>
   <p:sldIdLst>
     <p:sldId id="256" r:id="rId2"/>
@@ -21,7 +21,8 @@
     <p:sldId id="266" r:id="rId12"/>
     <p:sldId id="268" r:id="rId13"/>
     <p:sldId id="270" r:id="rId14"/>
-    <p:sldId id="259" r:id="rId15"/>
+    <p:sldId id="271" r:id="rId15"/>
+    <p:sldId id="259" r:id="rId16"/>
   </p:sldIdLst>
   <p:sldSz cx="12192000" cy="6858000"/>
   <p:notesSz cx="6858000" cy="9144000"/>
@@ -259,7 +260,7 @@
       <p15:sldGuideLst xmlns:p15="http://schemas.microsoft.com/office/powerpoint/2012/main"/>
     </p:ext>
     <p:ext uri="GoogleSlidesCustomDataVersion2">
-      <go:slidesCustomData xmlns="" xmlns:mc="http://schemas.openxmlformats.org/markup-compatibility/2006" xmlns:mv="urn:schemas-microsoft-com:mac:vml" xmlns:c="http://schemas.openxmlformats.org/drawingml/2006/chart" xmlns:dgm="http://schemas.openxmlformats.org/drawingml/2006/diagram" xmlns:o="urn:schemas-microsoft-com:office:office" xmlns:v="urn:schemas-microsoft-com:vml" xmlns:pvml="urn:schemas-microsoft-com:office:powerpoint" xmlns:com="http://schemas.openxmlformats.org/drawingml/2006/compatibility" xmlns:p14="http://schemas.microsoft.com/office/powerpoint/2010/main" xmlns:p15="http://schemas.microsoft.com/office/powerpoint/2012/main" xmlns:ahyp="http://schemas.microsoft.com/office/drawing/2018/hyperlinkcolor" xmlns:go="http://customooxmlschemas.google.com/" r:id="rId17" roundtripDataSignature="AMtx7mj5GdbxsaFl02bTEFBl/9s84/Z/Bw=="/>
+      <go:slidesCustomData xmlns:go="http://customooxmlschemas.google.com/" xmlns:ahyp="http://schemas.microsoft.com/office/drawing/2018/hyperlinkcolor" xmlns:p15="http://schemas.microsoft.com/office/powerpoint/2012/main" xmlns:p14="http://schemas.microsoft.com/office/powerpoint/2010/main" xmlns:com="http://schemas.openxmlformats.org/drawingml/2006/compatibility" xmlns:pvml="urn:schemas-microsoft-com:office:powerpoint" xmlns:v="urn:schemas-microsoft-com:vml" xmlns:o="urn:schemas-microsoft-com:office:office" xmlns:dgm="http://schemas.openxmlformats.org/drawingml/2006/diagram" xmlns:c="http://schemas.openxmlformats.org/drawingml/2006/chart" xmlns:mv="urn:schemas-microsoft-com:mac:vml" xmlns:mc="http://schemas.openxmlformats.org/markup-compatibility/2006" xmlns="" r:id="rId18" roundtripDataSignature="AMtx7mj5GdbxsaFl02bTEFBl/9s84/Z/Bw=="/>
     </p:ext>
   </p:extLst>
 </p:presentation>
@@ -1138,6 +1139,115 @@
 </file>
 
 <file path=ppt/notesSlides/notesSlide13.xml><?xml version="1.0" encoding="utf-8"?>
+<p:notes xmlns:a="http://schemas.openxmlformats.org/drawingml/2006/main" xmlns:r="http://schemas.openxmlformats.org/officeDocument/2006/relationships" xmlns:p="http://schemas.openxmlformats.org/presentationml/2006/main" showMasterSp="0" showMasterPhAnim="0">
+  <p:cSld>
+    <p:spTree>
+      <p:nvGrpSpPr>
+        <p:cNvPr id="1" name="Shape 55"/>
+        <p:cNvGrpSpPr/>
+        <p:nvPr/>
+      </p:nvGrpSpPr>
+      <p:grpSpPr>
+        <a:xfrm>
+          <a:off x="0" y="0"/>
+          <a:ext cx="0" cy="0"/>
+          <a:chOff x="0" y="0"/>
+          <a:chExt cx="0" cy="0"/>
+        </a:xfrm>
+      </p:grpSpPr>
+      <p:sp>
+        <p:nvSpPr>
+          <p:cNvPr id="56" name="Google Shape;56;p3:notes"/>
+          <p:cNvSpPr txBox="1">
+            <a:spLocks noGrp="1"/>
+          </p:cNvSpPr>
+          <p:nvPr>
+            <p:ph type="body" idx="1"/>
+          </p:nvPr>
+        </p:nvSpPr>
+        <p:spPr>
+          <a:xfrm>
+            <a:off x="685800" y="4343400"/>
+            <a:ext cx="5486400" cy="4114800"/>
+          </a:xfrm>
+          <a:prstGeom prst="rect">
+            <a:avLst/>
+          </a:prstGeom>
+        </p:spPr>
+        <p:txBody>
+          <a:bodyPr spcFirstLastPara="1" wrap="square" lIns="91425" tIns="91425" rIns="91425" bIns="91425" anchor="t" anchorCtr="0">
+            <a:noAutofit/>
+          </a:bodyPr>
+          <a:lstStyle/>
+          <a:p>
+            <a:pPr marL="0" lvl="0" indent="0" algn="l" rtl="0">
+              <a:spcBef>
+                <a:spcPts val="0"/>
+              </a:spcBef>
+              <a:spcAft>
+                <a:spcPts val="0"/>
+              </a:spcAft>
+              <a:buNone/>
+            </a:pPr>
+            <a:endParaRPr/>
+          </a:p>
+        </p:txBody>
+      </p:sp>
+      <p:sp>
+        <p:nvSpPr>
+          <p:cNvPr id="57" name="Google Shape;57;p3:notes"/>
+          <p:cNvSpPr>
+            <a:spLocks noGrp="1" noRot="1" noChangeAspect="1"/>
+          </p:cNvSpPr>
+          <p:nvPr>
+            <p:ph type="sldImg" idx="2"/>
+          </p:nvPr>
+        </p:nvSpPr>
+        <p:spPr>
+          <a:xfrm>
+            <a:off x="381000" y="685800"/>
+            <a:ext cx="6096000" cy="3429000"/>
+          </a:xfrm>
+          <a:custGeom>
+            <a:avLst/>
+            <a:gdLst/>
+            <a:ahLst/>
+            <a:cxnLst/>
+            <a:rect l="l" t="t" r="r" b="b"/>
+            <a:pathLst>
+              <a:path w="120000" h="120000" extrusionOk="0">
+                <a:moveTo>
+                  <a:pt x="0" y="0"/>
+                </a:moveTo>
+                <a:lnTo>
+                  <a:pt x="120000" y="0"/>
+                </a:lnTo>
+                <a:lnTo>
+                  <a:pt x="120000" y="120000"/>
+                </a:lnTo>
+                <a:lnTo>
+                  <a:pt x="0" y="120000"/>
+                </a:lnTo>
+                <a:close/>
+              </a:path>
+            </a:pathLst>
+          </a:custGeom>
+        </p:spPr>
+      </p:sp>
+    </p:spTree>
+    <p:extLst>
+      <p:ext uri="{BB962C8B-B14F-4D97-AF65-F5344CB8AC3E}">
+        <p14:creationId xmlns:p14="http://schemas.microsoft.com/office/powerpoint/2010/main" val="1251058554"/>
+      </p:ext>
+    </p:extLst>
+  </p:cSld>
+  <p:clrMapOvr>
+    <a:masterClrMapping/>
+  </p:clrMapOvr>
+</p:notes>
+</file>
+
+<file path=ppt/notesSlides/notesSlide14.xml><?xml version="1.0" encoding="utf-8"?>
 <p:notes xmlns:a="http://schemas.openxmlformats.org/drawingml/2006/main" xmlns:r="http://schemas.openxmlformats.org/officeDocument/2006/relationships" xmlns:p="http://schemas.openxmlformats.org/presentationml/2006/main" showMasterSp="0" showMasterPhAnim="0">
   <p:cSld>
     <p:spTree>
@@ -14704,6 +14814,390 @@
 </file>
 
 <file path=ppt/slides/slide14.xml><?xml version="1.0" encoding="utf-8"?>
+<p:sld xmlns:a="http://schemas.openxmlformats.org/drawingml/2006/main" xmlns:r="http://schemas.openxmlformats.org/officeDocument/2006/relationships" xmlns:p="http://schemas.openxmlformats.org/presentationml/2006/main">
+  <p:cSld>
+    <p:spTree>
+      <p:nvGrpSpPr>
+        <p:cNvPr id="1" name="Shape 58"/>
+        <p:cNvGrpSpPr/>
+        <p:nvPr/>
+      </p:nvGrpSpPr>
+      <p:grpSpPr>
+        <a:xfrm>
+          <a:off x="0" y="0"/>
+          <a:ext cx="0" cy="0"/>
+          <a:chOff x="0" y="0"/>
+          <a:chExt cx="0" cy="0"/>
+        </a:xfrm>
+      </p:grpSpPr>
+      <p:sp>
+        <p:nvSpPr>
+          <p:cNvPr id="59" name="Google Shape;59;p3"/>
+          <p:cNvSpPr txBox="1">
+            <a:spLocks noGrp="1"/>
+          </p:cNvSpPr>
+          <p:nvPr>
+            <p:ph type="title"/>
+          </p:nvPr>
+        </p:nvSpPr>
+        <p:spPr>
+          <a:xfrm>
+            <a:off x="605980" y="310143"/>
+            <a:ext cx="10515600" cy="649800"/>
+          </a:xfrm>
+          <a:prstGeom prst="rect">
+            <a:avLst/>
+          </a:prstGeom>
+          <a:noFill/>
+          <a:ln>
+            <a:noFill/>
+          </a:ln>
+        </p:spPr>
+        <p:txBody>
+          <a:bodyPr spcFirstLastPara="1" wrap="square" lIns="91425" tIns="45700" rIns="91425" bIns="45700" anchor="ctr" anchorCtr="0">
+            <a:normAutofit fontScale="90000"/>
+          </a:bodyPr>
+          <a:lstStyle/>
+          <a:p>
+            <a:pPr marL="0" lvl="0" indent="0" algn="l" rtl="0">
+              <a:lnSpc>
+                <a:spcPct val="90000"/>
+              </a:lnSpc>
+              <a:spcBef>
+                <a:spcPts val="0"/>
+              </a:spcBef>
+              <a:spcAft>
+                <a:spcPts val="0"/>
+              </a:spcAft>
+              <a:buClr>
+                <a:schemeClr val="dk1"/>
+              </a:buClr>
+              <a:buSzPts val="4400"/>
+              <a:buFont typeface="Malgun Gothic"/>
+              <a:buNone/>
+            </a:pPr>
+            <a:r>
+              <a:rPr lang="en-US" dirty="0"/>
+              <a:t>Appendix - PR </a:t>
+            </a:r>
+            <a:r>
+              <a:rPr lang="ko-KR" altLang="en-US" dirty="0"/>
+              <a:t>효율화</a:t>
+            </a:r>
+            <a:endParaRPr dirty="0"/>
+          </a:p>
+        </p:txBody>
+      </p:sp>
+      <p:pic>
+        <p:nvPicPr>
+          <p:cNvPr id="4" name="그림 3">
+            <a:extLst>
+              <a:ext uri="{FF2B5EF4-FFF2-40B4-BE49-F238E27FC236}">
+                <a16:creationId xmlns:a16="http://schemas.microsoft.com/office/drawing/2014/main" id="{0A7AFC66-0CBE-4298-9602-521B34133062}"/>
+              </a:ext>
+            </a:extLst>
+          </p:cNvPr>
+          <p:cNvPicPr>
+            <a:picLocks noChangeAspect="1"/>
+          </p:cNvPicPr>
+          <p:nvPr/>
+        </p:nvPicPr>
+        <p:blipFill>
+          <a:blip r:embed="rId3"/>
+          <a:stretch>
+            <a:fillRect/>
+          </a:stretch>
+        </p:blipFill>
+        <p:spPr>
+          <a:xfrm>
+            <a:off x="1143740" y="2358202"/>
+            <a:ext cx="4022758" cy="2684139"/>
+          </a:xfrm>
+          <a:prstGeom prst="rect">
+            <a:avLst/>
+          </a:prstGeom>
+        </p:spPr>
+      </p:pic>
+      <p:sp>
+        <p:nvSpPr>
+          <p:cNvPr id="6" name="TextBox 5">
+            <a:extLst>
+              <a:ext uri="{FF2B5EF4-FFF2-40B4-BE49-F238E27FC236}">
+                <a16:creationId xmlns:a16="http://schemas.microsoft.com/office/drawing/2014/main" id="{AC1B892C-F164-44E9-8E1B-F7AF266249E1}"/>
+              </a:ext>
+            </a:extLst>
+          </p:cNvPr>
+          <p:cNvSpPr txBox="1"/>
+          <p:nvPr/>
+        </p:nvSpPr>
+        <p:spPr>
+          <a:xfrm>
+            <a:off x="603817" y="1259924"/>
+            <a:ext cx="2246128" cy="415627"/>
+          </a:xfrm>
+          <a:prstGeom prst="rect">
+            <a:avLst/>
+          </a:prstGeom>
+          <a:noFill/>
+        </p:spPr>
+        <p:txBody>
+          <a:bodyPr wrap="none" rtlCol="0">
+            <a:spAutoFit/>
+          </a:bodyPr>
+          <a:lstStyle/>
+          <a:p>
+            <a:pPr>
+              <a:lnSpc>
+                <a:spcPct val="150000"/>
+              </a:lnSpc>
+            </a:pPr>
+            <a:r>
+              <a:rPr lang="ko-KR" altLang="en-US" sz="1600" dirty="0"/>
+              <a:t>▶ </a:t>
+            </a:r>
+            <a:r>
+              <a:rPr lang="en-US" altLang="ko-KR" sz="1600" dirty="0"/>
+              <a:t>PR Template </a:t>
+            </a:r>
+            <a:r>
+              <a:rPr lang="ko-KR" altLang="en-US" sz="1600" dirty="0"/>
+              <a:t>적용 </a:t>
+            </a:r>
+            <a:endParaRPr lang="en-US" altLang="ko-KR" sz="1600" dirty="0"/>
+          </a:p>
+        </p:txBody>
+      </p:sp>
+      <p:pic>
+        <p:nvPicPr>
+          <p:cNvPr id="7" name="그림 6">
+            <a:extLst>
+              <a:ext uri="{FF2B5EF4-FFF2-40B4-BE49-F238E27FC236}">
+                <a16:creationId xmlns:a16="http://schemas.microsoft.com/office/drawing/2014/main" id="{4A7C3B2C-B3CB-4EB6-B22E-9E967C6A7F90}"/>
+              </a:ext>
+            </a:extLst>
+          </p:cNvPr>
+          <p:cNvPicPr>
+            <a:picLocks noChangeAspect="1"/>
+          </p:cNvPicPr>
+          <p:nvPr/>
+        </p:nvPicPr>
+        <p:blipFill>
+          <a:blip r:embed="rId4"/>
+          <a:stretch>
+            <a:fillRect/>
+          </a:stretch>
+        </p:blipFill>
+        <p:spPr>
+          <a:xfrm>
+            <a:off x="6339098" y="1905441"/>
+            <a:ext cx="2896942" cy="3596543"/>
+          </a:xfrm>
+          <a:prstGeom prst="rect">
+            <a:avLst/>
+          </a:prstGeom>
+        </p:spPr>
+      </p:pic>
+      <p:sp>
+        <p:nvSpPr>
+          <p:cNvPr id="9" name="TextBox 8">
+            <a:extLst>
+              <a:ext uri="{FF2B5EF4-FFF2-40B4-BE49-F238E27FC236}">
+                <a16:creationId xmlns:a16="http://schemas.microsoft.com/office/drawing/2014/main" id="{EEC4013D-9DAA-4597-8F44-163454EC9839}"/>
+              </a:ext>
+            </a:extLst>
+          </p:cNvPr>
+          <p:cNvSpPr txBox="1"/>
+          <p:nvPr/>
+        </p:nvSpPr>
+        <p:spPr>
+          <a:xfrm>
+            <a:off x="6339098" y="1206658"/>
+            <a:ext cx="2302233" cy="415627"/>
+          </a:xfrm>
+          <a:prstGeom prst="rect">
+            <a:avLst/>
+          </a:prstGeom>
+          <a:noFill/>
+        </p:spPr>
+        <p:txBody>
+          <a:bodyPr wrap="none" rtlCol="0">
+            <a:spAutoFit/>
+          </a:bodyPr>
+          <a:lstStyle/>
+          <a:p>
+            <a:pPr>
+              <a:lnSpc>
+                <a:spcPct val="150000"/>
+              </a:lnSpc>
+            </a:pPr>
+            <a:r>
+              <a:rPr lang="ko-KR" altLang="en-US" sz="1600" dirty="0"/>
+              <a:t>▶ </a:t>
+            </a:r>
+            <a:r>
+              <a:rPr lang="en-US" altLang="ko-KR" sz="1600" dirty="0"/>
+              <a:t>PR Request </a:t>
+            </a:r>
+            <a:r>
+              <a:rPr lang="ko-KR" altLang="en-US" sz="1600" dirty="0"/>
+              <a:t>자동화</a:t>
+            </a:r>
+            <a:endParaRPr lang="en-US" altLang="ko-KR" sz="1600" dirty="0"/>
+          </a:p>
+        </p:txBody>
+      </p:sp>
+      <p:sp>
+        <p:nvSpPr>
+          <p:cNvPr id="10" name="직사각형 9">
+            <a:extLst>
+              <a:ext uri="{FF2B5EF4-FFF2-40B4-BE49-F238E27FC236}">
+                <a16:creationId xmlns:a16="http://schemas.microsoft.com/office/drawing/2014/main" id="{087262D4-DF20-447A-B877-70559EDA097E}"/>
+              </a:ext>
+            </a:extLst>
+          </p:cNvPr>
+          <p:cNvSpPr/>
+          <p:nvPr/>
+        </p:nvSpPr>
+        <p:spPr>
+          <a:xfrm>
+            <a:off x="390617" y="1127464"/>
+            <a:ext cx="5613764" cy="5420393"/>
+          </a:xfrm>
+          <a:prstGeom prst="rect">
+            <a:avLst/>
+          </a:prstGeom>
+          <a:noFill/>
+          <a:ln w="9525" cap="flat" cmpd="sng" algn="ctr">
+            <a:solidFill>
+              <a:schemeClr val="dk1"/>
+            </a:solidFill>
+            <a:prstDash val="solid"/>
+            <a:round/>
+            <a:headEnd type="none" w="med" len="med"/>
+            <a:tailEnd type="none" w="med" len="med"/>
+          </a:ln>
+        </p:spPr>
+        <p:style>
+          <a:lnRef idx="0">
+            <a:scrgbClr r="0" g="0" b="0"/>
+          </a:lnRef>
+          <a:fillRef idx="0">
+            <a:scrgbClr r="0" g="0" b="0"/>
+          </a:fillRef>
+          <a:effectRef idx="0">
+            <a:scrgbClr r="0" g="0" b="0"/>
+          </a:effectRef>
+          <a:fontRef idx="minor">
+            <a:schemeClr val="dk1"/>
+          </a:fontRef>
+        </p:style>
+        <p:txBody>
+          <a:bodyPr rtlCol="0" anchor="ctr"/>
+          <a:lstStyle/>
+          <a:p>
+            <a:pPr algn="ctr"/>
+            <a:endParaRPr lang="ko-KR" altLang="en-US"/>
+          </a:p>
+        </p:txBody>
+      </p:sp>
+      <p:sp>
+        <p:nvSpPr>
+          <p:cNvPr id="11" name="직사각형 10">
+            <a:extLst>
+              <a:ext uri="{FF2B5EF4-FFF2-40B4-BE49-F238E27FC236}">
+                <a16:creationId xmlns:a16="http://schemas.microsoft.com/office/drawing/2014/main" id="{07622877-9077-4044-BC0E-BDD0C1FAEF08}"/>
+              </a:ext>
+            </a:extLst>
+          </p:cNvPr>
+          <p:cNvSpPr/>
+          <p:nvPr/>
+        </p:nvSpPr>
+        <p:spPr>
+          <a:xfrm>
+            <a:off x="6187621" y="1127464"/>
+            <a:ext cx="5888971" cy="5420393"/>
+          </a:xfrm>
+          <a:prstGeom prst="rect">
+            <a:avLst/>
+          </a:prstGeom>
+          <a:noFill/>
+          <a:ln w="9525" cap="flat" cmpd="sng" algn="ctr">
+            <a:solidFill>
+              <a:schemeClr val="dk1"/>
+            </a:solidFill>
+            <a:prstDash val="solid"/>
+            <a:round/>
+            <a:headEnd type="none" w="med" len="med"/>
+            <a:tailEnd type="none" w="med" len="med"/>
+          </a:ln>
+        </p:spPr>
+        <p:style>
+          <a:lnRef idx="0">
+            <a:scrgbClr r="0" g="0" b="0"/>
+          </a:lnRef>
+          <a:fillRef idx="0">
+            <a:scrgbClr r="0" g="0" b="0"/>
+          </a:fillRef>
+          <a:effectRef idx="0">
+            <a:scrgbClr r="0" g="0" b="0"/>
+          </a:effectRef>
+          <a:fontRef idx="minor">
+            <a:schemeClr val="dk1"/>
+          </a:fontRef>
+        </p:style>
+        <p:txBody>
+          <a:bodyPr rtlCol="0" anchor="ctr"/>
+          <a:lstStyle/>
+          <a:p>
+            <a:pPr algn="ctr"/>
+            <a:endParaRPr lang="ko-KR" altLang="en-US"/>
+          </a:p>
+        </p:txBody>
+      </p:sp>
+      <p:pic>
+        <p:nvPicPr>
+          <p:cNvPr id="12" name="그림 11">
+            <a:extLst>
+              <a:ext uri="{FF2B5EF4-FFF2-40B4-BE49-F238E27FC236}">
+                <a16:creationId xmlns:a16="http://schemas.microsoft.com/office/drawing/2014/main" id="{F30D03D9-75B4-4F0D-970B-5957640871C8}"/>
+              </a:ext>
+            </a:extLst>
+          </p:cNvPr>
+          <p:cNvPicPr>
+            <a:picLocks noChangeAspect="1"/>
+          </p:cNvPicPr>
+          <p:nvPr/>
+        </p:nvPicPr>
+        <p:blipFill>
+          <a:blip r:embed="rId5"/>
+          <a:stretch>
+            <a:fillRect/>
+          </a:stretch>
+        </p:blipFill>
+        <p:spPr>
+          <a:xfrm>
+            <a:off x="9347541" y="1905441"/>
+            <a:ext cx="2658331" cy="3599510"/>
+          </a:xfrm>
+          <a:prstGeom prst="rect">
+            <a:avLst/>
+          </a:prstGeom>
+        </p:spPr>
+      </p:pic>
+    </p:spTree>
+    <p:extLst>
+      <p:ext uri="{BB962C8B-B14F-4D97-AF65-F5344CB8AC3E}">
+        <p14:creationId xmlns:p14="http://schemas.microsoft.com/office/powerpoint/2010/main" val="1361805124"/>
+      </p:ext>
+    </p:extLst>
+  </p:cSld>
+  <p:clrMapOvr>
+    <a:masterClrMapping/>
+  </p:clrMapOvr>
+</p:sld>
+</file>
+
+<file path=ppt/slides/slide15.xml><?xml version="1.0" encoding="utf-8"?>
 <p:sld xmlns:a="http://schemas.openxmlformats.org/drawingml/2006/main" xmlns:r="http://schemas.openxmlformats.org/officeDocument/2006/relationships" xmlns:p="http://schemas.openxmlformats.org/presentationml/2006/main">
   <p:cSld>
     <p:spTree>

</xml_diff>